<commit_message>
Video added and minor adjustments to txt & pptx
</commit_message>
<xml_diff>
--- a/PDI_ExpoJuego.pptx
+++ b/PDI_ExpoJuego.pptx
@@ -251,7 +251,7 @@
   </p:defaultTextStyle>
   <p:extLst>
     <p:ext uri="GoogleSlidesCustomDataVersion2">
-      <go:slidesCustomData xmlns:go="http://customooxmlschemas.google.com/" r:id="rId14" roundtripDataSignature="AMtx7mg8Hd2iOEbnbrJFg04rVo6+qi3LsQ=="/>
+      <go:slidesCustomData xmlns:go="http://customooxmlschemas.google.com/" r:id="rId14" roundtripDataSignature="AMtx7miRSd3sisBLvEtluwo1BcFXF5MUUw=="/>
     </p:ext>
   </p:extLst>
 </p:presentation>
@@ -2923,7 +2923,7 @@
   <p:cSld>
     <p:spTree>
       <p:nvGrpSpPr>
-        <p:cNvPr id="199" name="Shape 199"/>
+        <p:cNvPr id="200" name="Shape 200"/>
         <p:cNvGrpSpPr/>
         <p:nvPr/>
       </p:nvGrpSpPr>
@@ -2937,7 +2937,7 @@
       </p:grpSpPr>
       <p:sp>
         <p:nvSpPr>
-          <p:cNvPr id="200" name="Google Shape;200;g39b0084ecc4_1_160:notes"/>
+          <p:cNvPr id="201" name="Google Shape;201;g39b0084ecc4_1_160:notes"/>
           <p:cNvSpPr/>
           <p:nvPr>
             <p:ph idx="2" type="sldImg"/>
@@ -2972,7 +2972,7 @@
       </p:sp>
       <p:sp>
         <p:nvSpPr>
-          <p:cNvPr id="201" name="Google Shape;201;g39b0084ecc4_1_160:notes"/>
+          <p:cNvPr id="202" name="Google Shape;202;g39b0084ecc4_1_160:notes"/>
           <p:cNvSpPr txBox="1"/>
           <p:nvPr>
             <p:ph idx="1" type="body"/>
@@ -3011,7 +3011,7 @@
       </p:sp>
       <p:sp>
         <p:nvSpPr>
-          <p:cNvPr id="202" name="Google Shape;202;g39b0084ecc4_1_160:notes"/>
+          <p:cNvPr id="203" name="Google Shape;203;g39b0084ecc4_1_160:notes"/>
           <p:cNvSpPr txBox="1"/>
           <p:nvPr>
             <p:ph idx="12" type="sldNum"/>
@@ -3067,7 +3067,7 @@
   <p:cSld>
     <p:spTree>
       <p:nvGrpSpPr>
-        <p:cNvPr id="209" name="Shape 209"/>
+        <p:cNvPr id="210" name="Shape 210"/>
         <p:cNvGrpSpPr/>
         <p:nvPr/>
       </p:nvGrpSpPr>
@@ -3081,7 +3081,7 @@
       </p:grpSpPr>
       <p:sp>
         <p:nvSpPr>
-          <p:cNvPr id="210" name="Google Shape;210;p6:notes"/>
+          <p:cNvPr id="211" name="Google Shape;211;p6:notes"/>
           <p:cNvSpPr txBox="1"/>
           <p:nvPr>
             <p:ph idx="1" type="body"/>
@@ -3128,7 +3128,7 @@
       </p:sp>
       <p:sp>
         <p:nvSpPr>
-          <p:cNvPr id="211" name="Google Shape;211;p6:notes"/>
+          <p:cNvPr id="212" name="Google Shape;212;p6:notes"/>
           <p:cNvSpPr/>
           <p:nvPr>
             <p:ph idx="2" type="sldImg"/>
@@ -20115,7 +20115,7 @@
         <p:spPr>
           <a:xfrm>
             <a:off x="4355976" y="6381328"/>
-            <a:ext cx="4601324" cy="369332"/>
+            <a:ext cx="4601400" cy="369300"/>
           </a:xfrm>
           <a:prstGeom prst="rect">
             <a:avLst/>
@@ -20740,7 +20740,7 @@
                 <a:cs typeface="Calibri"/>
                 <a:sym typeface="Calibri"/>
               </a:rPr>
-              <a:t>Generacion de mascara binaria(Mano=Blanco, fondo=negro)</a:t>
+              <a:t>Generacion de mascara binaria (Mano=Blanco, fondo=negro)</a:t>
             </a:r>
             <a:endParaRPr>
               <a:latin typeface="Calibri"/>
@@ -20844,7 +20844,7 @@
                 <a:cs typeface="Calibri"/>
                 <a:sym typeface="Calibri"/>
               </a:rPr>
-              <a:t>(dedos y palma)</a:t>
+              <a:t>(Dedos y palma)</a:t>
             </a:r>
             <a:endParaRPr>
               <a:latin typeface="Calibri"/>
@@ -20965,7 +20965,7 @@
                 <a:cs typeface="Calibri"/>
                 <a:sym typeface="Calibri"/>
               </a:rPr>
-              <a:t>morfológico</a:t>
+              <a:t>morfológico </a:t>
             </a:r>
             <a:r>
               <a:rPr lang="es-CO">
@@ -20974,7 +20974,7 @@
                 <a:cs typeface="Calibri"/>
                 <a:sym typeface="Calibri"/>
               </a:rPr>
-              <a:t>(suavizar y unir regiones)</a:t>
+              <a:t>(Suavizar y unir regiones)</a:t>
             </a:r>
             <a:endParaRPr>
               <a:latin typeface="Calibri"/>
@@ -21155,7 +21155,7 @@
                 <a:cs typeface="Calibri"/>
                 <a:sym typeface="Calibri"/>
               </a:rPr>
-              <a:t> Bitwise AND (</a:t>
+              <a:t> Bitwise AND (S</a:t>
             </a:r>
             <a:r>
               <a:rPr lang="es-CO">
@@ -21164,7 +21164,7 @@
                 <a:cs typeface="Calibri"/>
                 <a:sym typeface="Calibri"/>
               </a:rPr>
-              <a:t>segmentación</a:t>
+              <a:t>egmentación</a:t>
             </a:r>
             <a:r>
               <a:rPr lang="es-CO">
@@ -21398,7 +21398,7 @@
                 <a:cs typeface="Calibri"/>
                 <a:sym typeface="Calibri"/>
               </a:rPr>
-              <a:t> real con los objetos(colisiones)</a:t>
+              <a:t> real con los objetos (Colisiones)</a:t>
             </a:r>
             <a:endParaRPr>
               <a:latin typeface="Calibri"/>
@@ -21837,7 +21837,7 @@
             </a:r>
             <a:r>
               <a:rPr lang="es-CO" sz="1300"/>
-              <a:t> mascar </a:t>
+              <a:t> máscara </a:t>
             </a:r>
             <a:r>
               <a:rPr lang="es-CO" sz="1300"/>
@@ -21889,7 +21889,7 @@
             </a:pPr>
             <a:r>
               <a:rPr lang="es-CO" sz="1300"/>
-              <a:t>-&gt;cierre </a:t>
+              <a:t>-&gt; Cierre </a:t>
             </a:r>
             <a:r>
               <a:rPr lang="es-CO" sz="1300"/>
@@ -22249,7 +22249,7 @@
             </a:pPr>
             <a:r>
               <a:rPr lang="es-CO" sz="1300"/>
-              <a:t>-&gt; control de objetos del juego </a:t>
+              <a:t>-&gt; Control de objetos del juego </a:t>
             </a:r>
             <a:r>
               <a:rPr lang="es-CO" sz="1300"/>
@@ -22542,23 +22542,7 @@
                   <a:schemeClr val="dk1"/>
                 </a:solidFill>
               </a:rPr>
-              <a:t>La </a:t>
-            </a:r>
-            <a:r>
-              <a:rPr b="1" lang="es-CO" sz="1100">
-                <a:solidFill>
-                  <a:schemeClr val="dk1"/>
-                </a:solidFill>
-              </a:rPr>
-              <a:t>captura de la imagen</a:t>
-            </a:r>
-            <a:r>
-              <a:rPr lang="es-CO" sz="1100">
-                <a:solidFill>
-                  <a:schemeClr val="dk1"/>
-                </a:solidFill>
-              </a:rPr>
-              <a:t> obtiene el flujo visual en tiempo real desde la cámara. Es la base del sistema y su calidad afecta la precisión del reconocimiento. </a:t>
+              <a:t>Obtener el flujo visual en tiempo real desde la cámara -&gt; Base del sistema y su calidad afecta la precisión del reconocimiento</a:t>
             </a:r>
             <a:endParaRPr b="0" i="0" sz="1300" u="none" cap="none" strike="noStrike">
               <a:solidFill>
@@ -22653,30 +22637,14 @@
               <a:buNone/>
             </a:pPr>
             <a:r>
-              <a:rPr lang="es-CO" sz="1100">
+              <a:rPr lang="es-CO" sz="1300">
                 <a:solidFill>
                   <a:schemeClr val="dk1"/>
                 </a:solidFill>
               </a:rPr>
-              <a:t>En el </a:t>
+              <a:t>Eliminar ruido y resaltar zonas relevantes para el análisis</a:t>
             </a:r>
-            <a:r>
-              <a:rPr b="1" lang="es-CO" sz="1100">
-                <a:solidFill>
-                  <a:schemeClr val="dk1"/>
-                </a:solidFill>
-              </a:rPr>
-              <a:t>preprocesado</a:t>
-            </a:r>
-            <a:r>
-              <a:rPr lang="es-CO" sz="1100">
-                <a:solidFill>
-                  <a:schemeClr val="dk1"/>
-                </a:solidFill>
-              </a:rPr>
-              <a:t>, se mejora la imagen aplicando técnicas como conversión a escala de grises, filtrado y normalización. Esto elimina ruido y resalta las zonas relevantes antes del análisis.</a:t>
-            </a:r>
-            <a:endParaRPr sz="1300"/>
+            <a:endParaRPr sz="1500"/>
           </a:p>
         </p:txBody>
       </p:sp>
@@ -22733,30 +22701,14 @@
               <a:buNone/>
             </a:pPr>
             <a:r>
-              <a:rPr lang="es-CO" sz="1100">
+              <a:rPr lang="es-CO" sz="1300">
                 <a:solidFill>
                   <a:schemeClr val="dk1"/>
                 </a:solidFill>
               </a:rPr>
-              <a:t>La </a:t>
+              <a:t>Separar la mano del fondo con umbralización por color o histograma -&gt; Resultado: Máscara binaria</a:t>
             </a:r>
-            <a:r>
-              <a:rPr b="1" lang="es-CO" sz="1100">
-                <a:solidFill>
-                  <a:schemeClr val="dk1"/>
-                </a:solidFill>
-              </a:rPr>
-              <a:t>segmentación</a:t>
-            </a:r>
-            <a:r>
-              <a:rPr lang="es-CO" sz="1100">
-                <a:solidFill>
-                  <a:schemeClr val="dk1"/>
-                </a:solidFill>
-              </a:rPr>
-              <a:t> separa la mano del fondo usando métodos como umbralización por color o histograma. El resultado es una máscara binaria que identifica los píxeles correspondientes a la mano.</a:t>
-            </a:r>
-            <a:endParaRPr sz="1300"/>
+            <a:endParaRPr sz="1500"/>
           </a:p>
         </p:txBody>
       </p:sp>
@@ -22813,30 +22765,14 @@
               <a:buNone/>
             </a:pPr>
             <a:r>
-              <a:rPr lang="es-CO" sz="1100">
+              <a:rPr lang="es-CO" sz="1300">
                 <a:solidFill>
                   <a:schemeClr val="dk1"/>
                 </a:solidFill>
               </a:rPr>
-              <a:t>La </a:t>
+              <a:t>Obtener información cuantitativa como el contorno, número de dedos o centroide -&gt; Expresar en fórmulas forma y posición de la mano</a:t>
             </a:r>
-            <a:r>
-              <a:rPr b="1" lang="es-CO" sz="1100">
-                <a:solidFill>
-                  <a:schemeClr val="dk1"/>
-                </a:solidFill>
-              </a:rPr>
-              <a:t>extracción de características</a:t>
-            </a:r>
-            <a:r>
-              <a:rPr lang="es-CO" sz="1100">
-                <a:solidFill>
-                  <a:schemeClr val="dk1"/>
-                </a:solidFill>
-              </a:rPr>
-              <a:t> obtiene información cuantitativa como el contorno, número de dedos o centroide. Estas propiedades representan matemáticamente la forma y posición de la mano.</a:t>
-            </a:r>
-            <a:endParaRPr sz="1300"/>
+            <a:endParaRPr sz="1500"/>
           </a:p>
         </p:txBody>
       </p:sp>
@@ -22893,30 +22829,14 @@
               <a:buNone/>
             </a:pPr>
             <a:r>
-              <a:rPr lang="es-CO" sz="1100">
+              <a:rPr lang="es-CO" sz="1300">
                 <a:solidFill>
                   <a:schemeClr val="dk1"/>
                 </a:solidFill>
               </a:rPr>
-              <a:t>En la </a:t>
+              <a:t>Clasificación de características -&gt; Identificación de patrones de la mano y gestos del usuario</a:t>
             </a:r>
-            <a:r>
-              <a:rPr b="1" lang="es-CO" sz="1100">
-                <a:solidFill>
-                  <a:schemeClr val="dk1"/>
-                </a:solidFill>
-              </a:rPr>
-              <a:t>clasificación</a:t>
-            </a:r>
-            <a:r>
-              <a:rPr lang="es-CO" sz="1100">
-                <a:solidFill>
-                  <a:schemeClr val="dk1"/>
-                </a:solidFill>
-              </a:rPr>
-              <a:t>, las características se comparan con patrones predefinidos o modelos entrenados. Esto permite reconocer qué gesto realiza el usuario en tiempo real.</a:t>
-            </a:r>
-            <a:endParaRPr sz="1300"/>
+            <a:endParaRPr sz="1500"/>
           </a:p>
         </p:txBody>
       </p:sp>
@@ -22973,30 +22893,14 @@
               <a:buNone/>
             </a:pPr>
             <a:r>
-              <a:rPr lang="es-CO" sz="1100">
+              <a:rPr lang="es-CO" sz="1300">
                 <a:solidFill>
                   <a:schemeClr val="dk1"/>
                 </a:solidFill>
               </a:rPr>
-              <a:t>la </a:t>
+              <a:t>Traducción de gestos en respuestas del sistema -&gt; Movimiento de la nave</a:t>
             </a:r>
-            <a:r>
-              <a:rPr b="1" lang="es-CO" sz="1100">
-                <a:solidFill>
-                  <a:schemeClr val="dk1"/>
-                </a:solidFill>
-              </a:rPr>
-              <a:t>acción</a:t>
-            </a:r>
-            <a:r>
-              <a:rPr lang="es-CO" sz="1100">
-                <a:solidFill>
-                  <a:schemeClr val="dk1"/>
-                </a:solidFill>
-              </a:rPr>
-              <a:t> traduce el gesto reconocido en una respuesta del sistema, como mover un objeto o seleccionar una opción. Así se logra la interacción sin contacto.</a:t>
-            </a:r>
-            <a:endParaRPr sz="1300"/>
+            <a:endParaRPr sz="1500"/>
           </a:p>
         </p:txBody>
       </p:sp>
@@ -23454,7 +23358,7 @@
             </a:pPr>
             <a:r>
               <a:rPr lang="es-CO" sz="1300"/>
-              <a:t>-&gt; operación mascar binaria</a:t>
+              <a:t>-&gt; Operación mascar binaria</a:t>
             </a:r>
             <a:endParaRPr sz="1300"/>
           </a:p>
@@ -23478,7 +23382,7 @@
             </a:pPr>
             <a:r>
               <a:rPr lang="es-CO" sz="1300"/>
-              <a:t>-&gt; operaciones bitwise</a:t>
+              <a:t>-&gt; Operaciones bitwise</a:t>
             </a:r>
             <a:endParaRPr sz="1300"/>
           </a:p>
@@ -23502,7 +23406,7 @@
             </a:pPr>
             <a:r>
               <a:rPr lang="es-CO" sz="1300"/>
-              <a:t>-&gt;cierre morfológico</a:t>
+              <a:t>-&gt; Cierre morfológico</a:t>
             </a:r>
             <a:endParaRPr sz="1300"/>
           </a:p>
@@ -23775,7 +23679,14 @@
             </a:pPr>
             <a:r>
               <a:rPr lang="es-CO" sz="1300"/>
-              <a:t>- Normalización de Colores: Igray​(x,y)=0.299R+0.587G+0.114B, asi ya que esa fórmula da más peso al canal verde, reproduciendo mejor cómo percibimos la luminosidad.</a:t>
+              <a:t>- Normalización de Colores: Igray​(x,y)=0.299R+0.587G+0.114B</a:t>
+            </a:r>
+            <a:br>
+              <a:rPr lang="es-CO" sz="1300"/>
+            </a:br>
+            <a:r>
+              <a:rPr lang="es-CO" sz="1300"/>
+              <a:t>- Más peso al canal verde</a:t>
             </a:r>
             <a:endParaRPr sz="1300"/>
           </a:p>
@@ -23899,7 +23810,7 @@
             </a:pPr>
             <a:r>
               <a:rPr lang="es-CO" sz="1300"/>
-              <a:t>- Operaciones Morfológicas: A∙B=(A⊕B)⊖B, esto quiere decir que </a:t>
+              <a:t>- Operaciones Morfológicas: A∙B=(A⊕B)⊖B -&gt; Dilatar, después erosionar</a:t>
             </a:r>
             <a:r>
               <a:rPr lang="es-CO" sz="1300">
@@ -23907,7 +23818,7 @@
                   <a:schemeClr val="dk1"/>
                 </a:solidFill>
               </a:rPr>
-              <a:t>el cierre </a:t>
+              <a:t> -&gt; </a:t>
             </a:r>
             <a:r>
               <a:rPr b="1" lang="es-CO" sz="1300">
@@ -23915,7 +23826,7 @@
                   <a:schemeClr val="dk1"/>
                 </a:solidFill>
               </a:rPr>
-              <a:t>primero dilata</a:t>
+              <a:t>Eliminar espacios pequeños dentro del objeto segmentado</a:t>
             </a:r>
             <a:r>
               <a:rPr lang="es-CO" sz="1300">
@@ -23931,39 +23842,7 @@
                   <a:schemeClr val="dk1"/>
                 </a:solidFill>
               </a:rPr>
-              <a:t>luego erosiona</a:t>
-            </a:r>
-            <a:r>
-              <a:rPr lang="es-CO" sz="1300">
-                <a:solidFill>
-                  <a:schemeClr val="dk1"/>
-                </a:solidFill>
-              </a:rPr>
-              <a:t>, con el mismo kernel, esto con el fin de </a:t>
-            </a:r>
-            <a:r>
-              <a:rPr b="1" lang="es-CO" sz="1300">
-                <a:solidFill>
-                  <a:schemeClr val="dk1"/>
-                </a:solidFill>
-              </a:rPr>
-              <a:t>eliminar agujeros o espacios pequeños dentro del objeto segmentado</a:t>
-            </a:r>
-            <a:r>
-              <a:rPr lang="es-CO" sz="1300">
-                <a:solidFill>
-                  <a:schemeClr val="dk1"/>
-                </a:solidFill>
-              </a:rPr>
-              <a:t>, y también </a:t>
-            </a:r>
-            <a:r>
-              <a:rPr b="1" lang="es-CO" sz="1300">
-                <a:solidFill>
-                  <a:schemeClr val="dk1"/>
-                </a:solidFill>
-              </a:rPr>
-              <a:t>para unir regiones cercanas</a:t>
+              <a:t>unir regiones cercanas</a:t>
             </a:r>
             <a:r>
               <a:rPr lang="es-CO" sz="1300">
@@ -24222,7 +24101,7 @@
             </a:pPr>
             <a:r>
               <a:rPr lang="es-CO" sz="1300"/>
-              <a:t>-&gt; detección de landmarks</a:t>
+              <a:t>-&gt; Detección de landmarks</a:t>
             </a:r>
             <a:endParaRPr sz="1300"/>
           </a:p>
@@ -24246,7 +24125,7 @@
             </a:pPr>
             <a:r>
               <a:rPr lang="es-CO" sz="1300"/>
-              <a:t>-&gt; cálculo de la posición (cx, cy)</a:t>
+              <a:t>-&gt; Cálculo de la posición (cx, cy)</a:t>
             </a:r>
             <a:endParaRPr sz="1300"/>
           </a:p>
@@ -24701,7 +24580,7 @@
           </a:bodyPr>
           <a:lstStyle/>
           <a:p>
-            <a:pPr indent="-273050" lvl="0" marL="285750" marR="0" rtl="0" algn="l">
+            <a:pPr indent="-323850" lvl="0" marL="457200" marR="0" rtl="0" algn="l">
               <a:lnSpc>
                 <a:spcPct val="100000"/>
               </a:lnSpc>
@@ -24714,12 +24593,11 @@
               <a:buClr>
                 <a:schemeClr val="dk1"/>
               </a:buClr>
-              <a:buSzPts val="1600"/>
-              <a:buFont typeface="Arial"/>
-              <a:buChar char="•"/>
+              <a:buSzPts val="1500"/>
+              <a:buChar char="●"/>
             </a:pPr>
             <a:r>
-              <a:rPr lang="es-CO" sz="1600">
+              <a:rPr lang="es-CO" sz="1500">
                 <a:solidFill>
                   <a:schemeClr val="dk1"/>
                 </a:solidFill>
@@ -24727,40 +24605,130 @@
               <a:t>Error promedio de </a:t>
             </a:r>
             <a:r>
-              <a:rPr lang="es-CO" sz="1600">
+              <a:rPr lang="es-CO" sz="1500">
                 <a:solidFill>
                   <a:schemeClr val="dk1"/>
                 </a:solidFill>
               </a:rPr>
-              <a:t>posición</a:t>
+              <a:t>posición </a:t>
             </a:r>
             <a:r>
-              <a:rPr lang="es-CO" sz="1600">
+              <a:rPr lang="es-CO" sz="1500">
                 <a:solidFill>
                   <a:schemeClr val="dk1"/>
                 </a:solidFill>
               </a:rPr>
-              <a:t>(Tracking error): Diferencia promedio de la posición detectada de la mano entre frames consecutivos. Esto quiere decir que mide la estabilidad del seguimiento, en nuestro caso fue de 6.12 pixeles, osea la posición detectada del centro de tu mano varió </a:t>
+              <a:t>(Tracking error): Diferencia promedio de la posición detectada de la mano entre frames consecutivos. </a:t>
             </a:r>
+            <a:endParaRPr sz="1500">
+              <a:solidFill>
+                <a:schemeClr val="dk1"/>
+              </a:solidFill>
+            </a:endParaRPr>
+          </a:p>
+          <a:p>
+            <a:pPr indent="0" lvl="0" marL="457200" marR="0" rtl="0" algn="l">
+              <a:lnSpc>
+                <a:spcPct val="100000"/>
+              </a:lnSpc>
+              <a:spcBef>
+                <a:spcPts val="0"/>
+              </a:spcBef>
+              <a:spcAft>
+                <a:spcPts val="0"/>
+              </a:spcAft>
+              <a:buNone/>
+            </a:pPr>
             <a:r>
-              <a:rPr lang="es-CO" sz="1600">
+              <a:t/>
+            </a:r>
+            <a:endParaRPr sz="1500">
+              <a:solidFill>
+                <a:schemeClr val="dk1"/>
+              </a:solidFill>
+            </a:endParaRPr>
+          </a:p>
+          <a:p>
+            <a:pPr indent="-323850" lvl="0" marL="457200" marR="0" rtl="0" algn="l">
+              <a:lnSpc>
+                <a:spcPct val="100000"/>
+              </a:lnSpc>
+              <a:spcBef>
+                <a:spcPts val="0"/>
+              </a:spcBef>
+              <a:spcAft>
+                <a:spcPts val="0"/>
+              </a:spcAft>
+              <a:buClr>
+                <a:schemeClr val="dk1"/>
+              </a:buClr>
+              <a:buSzPts val="1500"/>
+              <a:buChar char="●"/>
+            </a:pPr>
+            <a:r>
+              <a:rPr lang="es-CO" sz="1500">
                 <a:solidFill>
                   <a:schemeClr val="dk1"/>
                 </a:solidFill>
               </a:rPr>
-              <a:t>sólo</a:t>
+              <a:t>Rango: 5.8 a 6.9 pixeles -&gt; Precisión estable</a:t>
             </a:r>
+            <a:endParaRPr sz="1500">
+              <a:solidFill>
+                <a:schemeClr val="dk1"/>
+              </a:solidFill>
+            </a:endParaRPr>
+          </a:p>
+          <a:p>
+            <a:pPr indent="0" lvl="0" marL="457200" marR="0" rtl="0" algn="l">
+              <a:lnSpc>
+                <a:spcPct val="100000"/>
+              </a:lnSpc>
+              <a:spcBef>
+                <a:spcPts val="0"/>
+              </a:spcBef>
+              <a:spcAft>
+                <a:spcPts val="0"/>
+              </a:spcAft>
+              <a:buNone/>
+            </a:pPr>
             <a:r>
-              <a:rPr lang="es-CO" sz="1600">
+              <a:t/>
+            </a:r>
+            <a:endParaRPr sz="1500">
+              <a:solidFill>
+                <a:schemeClr val="dk1"/>
+              </a:solidFill>
+            </a:endParaRPr>
+          </a:p>
+          <a:p>
+            <a:pPr indent="-323850" lvl="0" marL="457200" marR="0" rtl="0" algn="l">
+              <a:lnSpc>
+                <a:spcPct val="100000"/>
+              </a:lnSpc>
+              <a:spcBef>
+                <a:spcPts val="0"/>
+              </a:spcBef>
+              <a:spcAft>
+                <a:spcPts val="0"/>
+              </a:spcAft>
+              <a:buClr>
+                <a:schemeClr val="dk1"/>
+              </a:buClr>
+              <a:buSzPts val="1500"/>
+              <a:buChar char="●"/>
+            </a:pPr>
+            <a:r>
+              <a:rPr lang="es-CO" sz="1500">
                 <a:solidFill>
                   <a:schemeClr val="dk1"/>
                 </a:solidFill>
               </a:rPr>
-              <a:t> ~6.1 px entre cuadros consecutivos, lo que indica un seguimiento muy estable.</a:t>
+              <a:t>σ = 0.4 pixeles -&gt; Sin desviaciones significativas</a:t>
             </a:r>
-            <a:endParaRPr i="0" sz="1600" u="none" cap="none" strike="noStrike">
+            <a:endParaRPr sz="1500">
               <a:solidFill>
-                <a:srgbClr val="000000"/>
+                <a:schemeClr val="dk1"/>
               </a:solidFill>
             </a:endParaRPr>
           </a:p>
@@ -24813,8 +24781,8 @@
         </p:blipFill>
         <p:spPr>
           <a:xfrm>
-            <a:off x="2216100" y="3164950"/>
-            <a:ext cx="4931150" cy="1143000"/>
+            <a:off x="827575" y="3758525"/>
+            <a:ext cx="3175675" cy="755475"/>
           </a:xfrm>
           <a:prstGeom prst="rect">
             <a:avLst/>
@@ -24841,8 +24809,36 @@
         </p:blipFill>
         <p:spPr>
           <a:xfrm>
-            <a:off x="2857500" y="4984900"/>
+            <a:off x="548500" y="4862925"/>
             <a:ext cx="3733800" cy="314325"/>
+          </a:xfrm>
+          <a:prstGeom prst="rect">
+            <a:avLst/>
+          </a:prstGeom>
+          <a:noFill/>
+          <a:ln>
+            <a:noFill/>
+          </a:ln>
+        </p:spPr>
+      </p:pic>
+      <p:pic>
+        <p:nvPicPr>
+          <p:cNvPr id="199" name="Google Shape;199;p5"/>
+          <p:cNvPicPr preferRelativeResize="0"/>
+          <p:nvPr/>
+        </p:nvPicPr>
+        <p:blipFill>
+          <a:blip r:embed="rId5">
+            <a:alphaModFix/>
+          </a:blip>
+          <a:stretch>
+            <a:fillRect/>
+          </a:stretch>
+        </p:blipFill>
+        <p:spPr>
+          <a:xfrm>
+            <a:off x="4578075" y="3422370"/>
+            <a:ext cx="4054325" cy="2652180"/>
           </a:xfrm>
           <a:prstGeom prst="rect">
             <a:avLst/>
@@ -24866,7 +24862,7 @@
   <p:cSld>
     <p:spTree>
       <p:nvGrpSpPr>
-        <p:cNvPr id="203" name="Shape 203"/>
+        <p:cNvPr id="204" name="Shape 204"/>
         <p:cNvGrpSpPr/>
         <p:nvPr/>
       </p:nvGrpSpPr>
@@ -24880,7 +24876,7 @@
       </p:grpSpPr>
       <p:sp>
         <p:nvSpPr>
-          <p:cNvPr id="204" name="Google Shape;204;g39b0084ecc4_1_160"/>
+          <p:cNvPr id="205" name="Google Shape;205;g39b0084ecc4_1_160"/>
           <p:cNvSpPr txBox="1"/>
           <p:nvPr/>
         </p:nvSpPr>
@@ -24942,83 +24938,7 @@
                 <a:cs typeface="Calibri"/>
                 <a:sym typeface="Calibri"/>
               </a:rPr>
-              <a:t> futuras: tres líneas de </a:t>
-            </a:r>
-            <a:r>
-              <a:rPr lang="es-CO" sz="1800">
-                <a:solidFill>
-                  <a:schemeClr val="dk1"/>
-                </a:solidFill>
-                <a:latin typeface="Calibri"/>
-                <a:ea typeface="Calibri"/>
-                <a:cs typeface="Calibri"/>
-                <a:sym typeface="Calibri"/>
-              </a:rPr>
-              <a:t>cómo</a:t>
-            </a:r>
-            <a:r>
-              <a:rPr b="0" i="0" lang="es-CO" sz="1800" u="none" cap="none" strike="noStrike">
-                <a:solidFill>
-                  <a:schemeClr val="dk1"/>
-                </a:solidFill>
-                <a:latin typeface="Calibri"/>
-                <a:ea typeface="Calibri"/>
-                <a:cs typeface="Calibri"/>
-                <a:sym typeface="Calibri"/>
-              </a:rPr>
-              <a:t> se puede mejorar su propuesta y como:</a:t>
-            </a:r>
-            <a:endParaRPr b="0" i="0" sz="1400" u="none" cap="none" strike="noStrike">
-              <a:solidFill>
-                <a:srgbClr val="000000"/>
-              </a:solidFill>
-              <a:latin typeface="Arial"/>
-              <a:ea typeface="Arial"/>
-              <a:cs typeface="Arial"/>
-              <a:sym typeface="Arial"/>
-            </a:endParaRPr>
-          </a:p>
-          <a:p>
-            <a:pPr indent="-285750" lvl="2" marL="1200150" marR="0" rtl="0" algn="l">
-              <a:lnSpc>
-                <a:spcPct val="100000"/>
-              </a:lnSpc>
-              <a:spcBef>
-                <a:spcPts val="0"/>
-              </a:spcBef>
-              <a:spcAft>
-                <a:spcPts val="0"/>
-              </a:spcAft>
-              <a:buClr>
-                <a:schemeClr val="dk1"/>
-              </a:buClr>
-              <a:buSzPts val="1800"/>
-              <a:buFont typeface="Noto Sans Symbols"/>
-              <a:buChar char="➢"/>
-            </a:pPr>
-            <a:r>
-              <a:rPr b="0" i="0" lang="es-CO" sz="1800" u="none" cap="none" strike="noStrike">
-                <a:solidFill>
-                  <a:schemeClr val="dk1"/>
-                </a:solidFill>
-                <a:latin typeface="Calibri"/>
-                <a:ea typeface="Calibri"/>
-                <a:cs typeface="Calibri"/>
-                <a:sym typeface="Calibri"/>
-              </a:rPr>
-              <a:t>	</a:t>
-            </a:r>
-            <a:r>
-              <a:rPr lang="es-CO" sz="1800">
-                <a:solidFill>
-                  <a:schemeClr val="dk1"/>
-                </a:solidFill>
-                <a:latin typeface="Calibri"/>
-                <a:ea typeface="Calibri"/>
-                <a:cs typeface="Calibri"/>
-                <a:sym typeface="Calibri"/>
-              </a:rPr>
-              <a:t>Optimización de precisión, esto quiere decir Reducción de ruido con filtros adaptativos o de mediana.</a:t>
+              <a:t> futuras:</a:t>
             </a:r>
             <a:endParaRPr b="0" i="0" sz="1800" u="none" cap="none" strike="noStrike">
               <a:solidFill>
@@ -25031,72 +24951,22 @@
             </a:endParaRPr>
           </a:p>
           <a:p>
-            <a:pPr indent="-285750" lvl="2" marL="1200150" marR="0" rtl="0" algn="l">
-              <a:lnSpc>
-                <a:spcPct val="100000"/>
-              </a:lnSpc>
-              <a:spcBef>
-                <a:spcPts val="0"/>
-              </a:spcBef>
-              <a:spcAft>
-                <a:spcPts val="0"/>
-              </a:spcAft>
-              <a:buClr>
-                <a:schemeClr val="dk1"/>
-              </a:buClr>
-              <a:buSzPts val="1800"/>
-              <a:buFont typeface="Noto Sans Symbols"/>
-              <a:buChar char="➢"/>
+            <a:pPr indent="0" lvl="0" marL="457200" marR="0" rtl="0" algn="l">
+              <a:lnSpc>
+                <a:spcPct val="100000"/>
+              </a:lnSpc>
+              <a:spcBef>
+                <a:spcPts val="0"/>
+              </a:spcBef>
+              <a:spcAft>
+                <a:spcPts val="0"/>
+              </a:spcAft>
+              <a:buNone/>
             </a:pPr>
             <a:r>
-              <a:rPr b="0" i="0" lang="es-CO" sz="1800" u="none" cap="none" strike="noStrike">
-                <a:solidFill>
-                  <a:schemeClr val="dk1"/>
-                </a:solidFill>
-                <a:latin typeface="Calibri"/>
-                <a:ea typeface="Calibri"/>
-                <a:cs typeface="Calibri"/>
-                <a:sym typeface="Calibri"/>
-              </a:rPr>
-              <a:t>	</a:t>
+              <a:t/>
             </a:r>
-            <a:r>
-              <a:rPr lang="es-CO" sz="1800">
-                <a:solidFill>
-                  <a:schemeClr val="dk1"/>
-                </a:solidFill>
-                <a:latin typeface="Calibri"/>
-                <a:ea typeface="Calibri"/>
-                <a:cs typeface="Calibri"/>
-                <a:sym typeface="Calibri"/>
-              </a:rPr>
-              <a:t>Mayor robustez, </a:t>
-            </a:r>
-            <a:r>
-              <a:rPr lang="es-CO" sz="1800">
-                <a:solidFill>
-                  <a:schemeClr val="dk1"/>
-                </a:solidFill>
-                <a:latin typeface="Calibri"/>
-                <a:ea typeface="Calibri"/>
-                <a:cs typeface="Calibri"/>
-                <a:sym typeface="Calibri"/>
-              </a:rPr>
-              <a:t>ósea</a:t>
-            </a:r>
-            <a:r>
-              <a:rPr lang="es-CO" sz="1800">
-                <a:solidFill>
-                  <a:schemeClr val="dk1"/>
-                </a:solidFill>
-                <a:latin typeface="Calibri"/>
-                <a:ea typeface="Calibri"/>
-                <a:cs typeface="Calibri"/>
-                <a:sym typeface="Calibri"/>
-              </a:rPr>
-              <a:t> detección de fondo dinámico o múltiples manos.</a:t>
-            </a:r>
-            <a:endParaRPr b="0" i="0" sz="1800" u="none" cap="none" strike="noStrike">
+            <a:endParaRPr sz="1800">
               <a:solidFill>
                 <a:schemeClr val="dk1"/>
               </a:solidFill>
@@ -25146,7 +25016,73 @@
                 <a:cs typeface="Calibri"/>
                 <a:sym typeface="Calibri"/>
               </a:rPr>
-              <a:t>Integración con otros dispositivos, como lo </a:t>
+              <a:t>Optimización de precisión -&gt; Filtros de reducción de ruido</a:t>
+            </a:r>
+            <a:endParaRPr sz="1800">
+              <a:solidFill>
+                <a:schemeClr val="dk1"/>
+              </a:solidFill>
+              <a:latin typeface="Calibri"/>
+              <a:ea typeface="Calibri"/>
+              <a:cs typeface="Calibri"/>
+              <a:sym typeface="Calibri"/>
+            </a:endParaRPr>
+          </a:p>
+          <a:p>
+            <a:pPr indent="0" lvl="0" marL="1371600" marR="0" rtl="0" algn="l">
+              <a:lnSpc>
+                <a:spcPct val="100000"/>
+              </a:lnSpc>
+              <a:spcBef>
+                <a:spcPts val="0"/>
+              </a:spcBef>
+              <a:spcAft>
+                <a:spcPts val="0"/>
+              </a:spcAft>
+              <a:buNone/>
+            </a:pPr>
+            <a:r>
+              <a:t/>
+            </a:r>
+            <a:endParaRPr sz="1800">
+              <a:solidFill>
+                <a:schemeClr val="dk1"/>
+              </a:solidFill>
+              <a:latin typeface="Calibri"/>
+              <a:ea typeface="Calibri"/>
+              <a:cs typeface="Calibri"/>
+              <a:sym typeface="Calibri"/>
+            </a:endParaRPr>
+          </a:p>
+          <a:p>
+            <a:pPr indent="-285750" lvl="2" marL="1200150" marR="0" rtl="0" algn="l">
+              <a:lnSpc>
+                <a:spcPct val="100000"/>
+              </a:lnSpc>
+              <a:spcBef>
+                <a:spcPts val="0"/>
+              </a:spcBef>
+              <a:spcAft>
+                <a:spcPts val="0"/>
+              </a:spcAft>
+              <a:buClr>
+                <a:schemeClr val="dk1"/>
+              </a:buClr>
+              <a:buSzPts val="1800"/>
+              <a:buFont typeface="Noto Sans Symbols"/>
+              <a:buChar char="➢"/>
+            </a:pPr>
+            <a:r>
+              <a:rPr b="0" i="0" lang="es-CO" sz="1800" u="none" cap="none" strike="noStrike">
+                <a:solidFill>
+                  <a:schemeClr val="dk1"/>
+                </a:solidFill>
+                <a:latin typeface="Calibri"/>
+                <a:ea typeface="Calibri"/>
+                <a:cs typeface="Calibri"/>
+                <a:sym typeface="Calibri"/>
+              </a:rPr>
+              <a:t>	</a:t>
             </a:r>
             <a:r>
               <a:rPr lang="es-CO" sz="1800">
@@ -25158,7 +25094,73 @@
                 <a:cs typeface="Calibri"/>
                 <a:sym typeface="Calibri"/>
               </a:rPr>
-              <a:t>sería</a:t>
+              <a:t>Mayor robustez -&gt; Detección de fondo dinámico o múltiples manos.</a:t>
+            </a:r>
+            <a:endParaRPr sz="1800">
+              <a:solidFill>
+                <a:schemeClr val="dk1"/>
+              </a:solidFill>
+              <a:latin typeface="Calibri"/>
+              <a:ea typeface="Calibri"/>
+              <a:cs typeface="Calibri"/>
+              <a:sym typeface="Calibri"/>
+            </a:endParaRPr>
+          </a:p>
+          <a:p>
+            <a:pPr indent="0" lvl="0" marL="1371600" marR="0" rtl="0" algn="l">
+              <a:lnSpc>
+                <a:spcPct val="100000"/>
+              </a:lnSpc>
+              <a:spcBef>
+                <a:spcPts val="0"/>
+              </a:spcBef>
+              <a:spcAft>
+                <a:spcPts val="0"/>
+              </a:spcAft>
+              <a:buNone/>
+            </a:pPr>
+            <a:r>
+              <a:t/>
+            </a:r>
+            <a:endParaRPr sz="1800">
+              <a:solidFill>
+                <a:schemeClr val="dk1"/>
+              </a:solidFill>
+              <a:latin typeface="Calibri"/>
+              <a:ea typeface="Calibri"/>
+              <a:cs typeface="Calibri"/>
+              <a:sym typeface="Calibri"/>
+            </a:endParaRPr>
+          </a:p>
+          <a:p>
+            <a:pPr indent="-285750" lvl="2" marL="1200150" marR="0" rtl="0" algn="l">
+              <a:lnSpc>
+                <a:spcPct val="100000"/>
+              </a:lnSpc>
+              <a:spcBef>
+                <a:spcPts val="0"/>
+              </a:spcBef>
+              <a:spcAft>
+                <a:spcPts val="0"/>
+              </a:spcAft>
+              <a:buClr>
+                <a:schemeClr val="dk1"/>
+              </a:buClr>
+              <a:buSzPts val="1800"/>
+              <a:buFont typeface="Noto Sans Symbols"/>
+              <a:buChar char="➢"/>
+            </a:pPr>
+            <a:r>
+              <a:rPr b="0" i="0" lang="es-CO" sz="1800" u="none" cap="none" strike="noStrike">
+                <a:solidFill>
+                  <a:schemeClr val="dk1"/>
+                </a:solidFill>
+                <a:latin typeface="Calibri"/>
+                <a:ea typeface="Calibri"/>
+                <a:cs typeface="Calibri"/>
+                <a:sym typeface="Calibri"/>
+              </a:rPr>
+              <a:t>	</a:t>
             </a:r>
             <a:r>
               <a:rPr lang="es-CO" sz="1800">
@@ -25170,7 +25172,7 @@
                 <a:cs typeface="Calibri"/>
                 <a:sym typeface="Calibri"/>
               </a:rPr>
-              <a:t> con realidad aumentada o gafas VR.</a:t>
+              <a:t>Integración con otros dispositivos-&gt; VR o AR</a:t>
             </a:r>
             <a:endParaRPr b="0" i="0" sz="1800" u="none" cap="none" strike="noStrike">
               <a:solidFill>
@@ -25217,7 +25219,7 @@
       </p:sp>
       <p:sp>
         <p:nvSpPr>
-          <p:cNvPr id="205" name="Google Shape;205;g39b0084ecc4_1_160"/>
+          <p:cNvPr id="206" name="Google Shape;206;g39b0084ecc4_1_160"/>
           <p:cNvSpPr txBox="1"/>
           <p:nvPr/>
         </p:nvSpPr>
@@ -25283,7 +25285,7 @@
       </p:sp>
       <p:pic>
         <p:nvPicPr>
-          <p:cNvPr id="206" name="Google Shape;206;g39b0084ecc4_1_160"/>
+          <p:cNvPr id="207" name="Google Shape;207;g39b0084ecc4_1_160"/>
           <p:cNvPicPr preferRelativeResize="0"/>
           <p:nvPr/>
         </p:nvPicPr>
@@ -25311,7 +25313,7 @@
       </p:pic>
       <p:pic>
         <p:nvPicPr>
-          <p:cNvPr id="207" name="Google Shape;207;g39b0084ecc4_1_160"/>
+          <p:cNvPr id="208" name="Google Shape;208;g39b0084ecc4_1_160"/>
           <p:cNvPicPr preferRelativeResize="0"/>
           <p:nvPr/>
         </p:nvPicPr>
@@ -25339,7 +25341,7 @@
       </p:pic>
       <p:sp>
         <p:nvSpPr>
-          <p:cNvPr id="208" name="Google Shape;208;g39b0084ecc4_1_160"/>
+          <p:cNvPr id="209" name="Google Shape;209;g39b0084ecc4_1_160"/>
           <p:cNvSpPr txBox="1"/>
           <p:nvPr/>
         </p:nvSpPr>
@@ -25442,7 +25444,7 @@
   <p:cSld>
     <p:spTree>
       <p:nvGrpSpPr>
-        <p:cNvPr id="212" name="Shape 212"/>
+        <p:cNvPr id="213" name="Shape 213"/>
         <p:cNvGrpSpPr/>
         <p:nvPr/>
       </p:nvGrpSpPr>
@@ -25456,7 +25458,7 @@
       </p:grpSpPr>
       <p:sp>
         <p:nvSpPr>
-          <p:cNvPr id="213" name="Google Shape;213;p6"/>
+          <p:cNvPr id="214" name="Google Shape;214;p6"/>
           <p:cNvSpPr txBox="1"/>
           <p:nvPr>
             <p:ph type="title"/>
@@ -25524,7 +25526,7 @@
       </p:sp>
       <p:sp>
         <p:nvSpPr>
-          <p:cNvPr id="214" name="Google Shape;214;p6"/>
+          <p:cNvPr id="215" name="Google Shape;215;p6"/>
           <p:cNvSpPr txBox="1"/>
           <p:nvPr/>
         </p:nvSpPr>

</xml_diff>

<commit_message>
Minor adjustment to pptx
</commit_message>
<xml_diff>
--- a/PDI_ExpoJuego.pptx
+++ b/PDI_ExpoJuego.pptx
@@ -19366,6 +19366,30 @@
               <a:buNone/>
             </a:pPr>
             <a:r>
+              <a:rPr lang="es-CO" sz="2170"/>
+              <a:t>Semestre 2025 - 2</a:t>
+            </a:r>
+            <a:endParaRPr sz="2170"/>
+          </a:p>
+          <a:p>
+            <a:pPr indent="0" lvl="0" marL="0" marR="0" rtl="0" algn="ctr">
+              <a:lnSpc>
+                <a:spcPct val="80000"/>
+              </a:lnSpc>
+              <a:spcBef>
+                <a:spcPts val="434"/>
+              </a:spcBef>
+              <a:spcAft>
+                <a:spcPts val="0"/>
+              </a:spcAft>
+              <a:buClr>
+                <a:srgbClr val="888888"/>
+              </a:buClr>
+              <a:buSzPts val="2170"/>
+              <a:buFont typeface="Arial"/>
+              <a:buNone/>
+            </a:pPr>
+            <a:r>
               <a:t/>
             </a:r>
             <a:endParaRPr/>
@@ -25533,7 +25557,7 @@
         <p:spPr>
           <a:xfrm>
             <a:off x="457200" y="1487225"/>
-            <a:ext cx="8229600" cy="4128600"/>
+            <a:ext cx="8229600" cy="4456200"/>
           </a:xfrm>
           <a:prstGeom prst="rect">
             <a:avLst/>
@@ -25604,7 +25628,199 @@
                   <a:schemeClr val="dk1"/>
                 </a:solidFill>
               </a:rPr>
-              <a:t>[1] L.P. Yaroslavsky, K.O. Egiazarian, and J.T. Astola. Transform domain image</a:t>
+              <a:t>[1] A. Kumar Boyat y B. Kumar Joshi. A review paper: Noise models inn digital image</a:t>
+            </a:r>
+            <a:endParaRPr sz="1200">
+              <a:solidFill>
+                <a:schemeClr val="dk1"/>
+              </a:solidFill>
+            </a:endParaRPr>
+          </a:p>
+          <a:p>
+            <a:pPr indent="0" lvl="0" marL="0" rtl="0" algn="l">
+              <a:lnSpc>
+                <a:spcPct val="115000"/>
+              </a:lnSpc>
+              <a:spcBef>
+                <a:spcPts val="0"/>
+              </a:spcBef>
+              <a:spcAft>
+                <a:spcPts val="0"/>
+              </a:spcAft>
+              <a:buClr>
+                <a:schemeClr val="dk1"/>
+              </a:buClr>
+              <a:buSzPts val="1100"/>
+              <a:buFont typeface="Arial"/>
+              <a:buNone/>
+            </a:pPr>
+            <a:r>
+              <a:rPr lang="es-CO" sz="1200">
+                <a:solidFill>
+                  <a:schemeClr val="dk1"/>
+                </a:solidFill>
+              </a:rPr>
+              <a:t>processing. Signal &amp; Image Processing: An International Journal (SIPIJ) Vol.6, No.2, April</a:t>
+            </a:r>
+            <a:endParaRPr sz="1200">
+              <a:solidFill>
+                <a:schemeClr val="dk1"/>
+              </a:solidFill>
+            </a:endParaRPr>
+          </a:p>
+          <a:p>
+            <a:pPr indent="0" lvl="0" marL="0" rtl="0" algn="l">
+              <a:lnSpc>
+                <a:spcPct val="115000"/>
+              </a:lnSpc>
+              <a:spcBef>
+                <a:spcPts val="0"/>
+              </a:spcBef>
+              <a:spcAft>
+                <a:spcPts val="0"/>
+              </a:spcAft>
+              <a:buClr>
+                <a:schemeClr val="dk1"/>
+              </a:buClr>
+              <a:buSzPts val="1100"/>
+              <a:buFont typeface="Arial"/>
+              <a:buNone/>
+            </a:pPr>
+            <a:r>
+              <a:rPr lang="es-CO" sz="1200">
+                <a:solidFill>
+                  <a:schemeClr val="dk1"/>
+                </a:solidFill>
+              </a:rPr>
+              <a:t>2015.</a:t>
+            </a:r>
+            <a:endParaRPr sz="1200">
+              <a:solidFill>
+                <a:schemeClr val="dk1"/>
+              </a:solidFill>
+            </a:endParaRPr>
+          </a:p>
+          <a:p>
+            <a:pPr indent="0" lvl="0" marL="0" rtl="0" algn="l">
+              <a:lnSpc>
+                <a:spcPct val="115000"/>
+              </a:lnSpc>
+              <a:spcBef>
+                <a:spcPts val="0"/>
+              </a:spcBef>
+              <a:spcAft>
+                <a:spcPts val="0"/>
+              </a:spcAft>
+              <a:buClr>
+                <a:schemeClr val="dk1"/>
+              </a:buClr>
+              <a:buSzPts val="1100"/>
+              <a:buFont typeface="Arial"/>
+              <a:buNone/>
+            </a:pPr>
+            <a:r>
+              <a:rPr lang="es-CO" sz="1200">
+                <a:solidFill>
+                  <a:schemeClr val="dk1"/>
+                </a:solidFill>
+              </a:rPr>
+              <a:t>[2] Blokdyk, G. (2020). Artificial vision. A complete guide. Emereo Publishing.</a:t>
+            </a:r>
+            <a:endParaRPr sz="1200">
+              <a:solidFill>
+                <a:schemeClr val="dk1"/>
+              </a:solidFill>
+            </a:endParaRPr>
+          </a:p>
+          <a:p>
+            <a:pPr indent="0" lvl="0" marL="0" rtl="0" algn="l">
+              <a:lnSpc>
+                <a:spcPct val="115000"/>
+              </a:lnSpc>
+              <a:spcBef>
+                <a:spcPts val="0"/>
+              </a:spcBef>
+              <a:spcAft>
+                <a:spcPts val="0"/>
+              </a:spcAft>
+              <a:buClr>
+                <a:schemeClr val="dk1"/>
+              </a:buClr>
+              <a:buSzPts val="1100"/>
+              <a:buFont typeface="Arial"/>
+              <a:buNone/>
+            </a:pPr>
+            <a:r>
+              <a:rPr lang="es-CO" sz="1200">
+                <a:solidFill>
+                  <a:schemeClr val="dk1"/>
+                </a:solidFill>
+              </a:rPr>
+              <a:t>[3] E. Woods, R., &amp; C. Gonzalez, R. (2018). Digital image processing (4a ed.). Pearson.</a:t>
+            </a:r>
+            <a:endParaRPr sz="1200">
+              <a:solidFill>
+                <a:schemeClr val="dk1"/>
+              </a:solidFill>
+            </a:endParaRPr>
+          </a:p>
+          <a:p>
+            <a:pPr indent="0" lvl="0" marL="0" rtl="0" algn="l">
+              <a:lnSpc>
+                <a:spcPct val="115000"/>
+              </a:lnSpc>
+              <a:spcBef>
+                <a:spcPts val="0"/>
+              </a:spcBef>
+              <a:spcAft>
+                <a:spcPts val="0"/>
+              </a:spcAft>
+              <a:buClr>
+                <a:schemeClr val="dk1"/>
+              </a:buClr>
+              <a:buSzPts val="1100"/>
+              <a:buFont typeface="Arial"/>
+              <a:buNone/>
+            </a:pPr>
+            <a:r>
+              <a:rPr lang="es-CO" sz="1200">
+                <a:solidFill>
+                  <a:schemeClr val="dk1"/>
+                </a:solidFill>
+              </a:rPr>
+              <a:t>[4] Fernández Mc Cann, D. S. (2023). Procesamiento digital de imágenes - Un enfoque práctico. Otras publicaciones Universidad de Antioquia.</a:t>
+            </a:r>
+            <a:endParaRPr b="1" sz="1200">
+              <a:solidFill>
+                <a:schemeClr val="dk1"/>
+              </a:solidFill>
+            </a:endParaRPr>
+          </a:p>
+          <a:p>
+            <a:pPr indent="0" lvl="0" marL="0" rtl="0" algn="l">
+              <a:lnSpc>
+                <a:spcPct val="115000"/>
+              </a:lnSpc>
+              <a:spcBef>
+                <a:spcPts val="0"/>
+              </a:spcBef>
+              <a:spcAft>
+                <a:spcPts val="0"/>
+              </a:spcAft>
+              <a:buClr>
+                <a:schemeClr val="dk1"/>
+              </a:buClr>
+              <a:buSzPts val="1100"/>
+              <a:buFont typeface="Arial"/>
+              <a:buNone/>
+            </a:pPr>
+            <a:r>
+              <a:rPr lang="es-CO" sz="1200">
+                <a:solidFill>
+                  <a:schemeClr val="dk1"/>
+                </a:solidFill>
+              </a:rPr>
+              <a:t>[5] L.P. Yaroslavsky, K.O. Egiazarian, and J.T. Astola. Transform domain image</a:t>
             </a:r>
             <a:endParaRPr sz="1200">
               <a:solidFill>
@@ -25695,172 +25911,7 @@
               <a:buNone/>
             </a:pPr>
             <a:r>
-              <a:rPr lang="es-CO" sz="1200">
-                <a:solidFill>
-                  <a:schemeClr val="dk1"/>
-                </a:solidFill>
-              </a:rPr>
-              <a:t>[2] A. Kumar Boyat y B. Kumar Joshi. A review paper: Noise models inn digital image</a:t>
-            </a:r>
-            <a:endParaRPr sz="1200">
-              <a:solidFill>
-                <a:schemeClr val="dk1"/>
-              </a:solidFill>
-            </a:endParaRPr>
-          </a:p>
-          <a:p>
-            <a:pPr indent="0" lvl="0" marL="0" rtl="0" algn="l">
-              <a:lnSpc>
-                <a:spcPct val="115000"/>
-              </a:lnSpc>
-              <a:spcBef>
-                <a:spcPts val="0"/>
-              </a:spcBef>
-              <a:spcAft>
-                <a:spcPts val="0"/>
-              </a:spcAft>
-              <a:buClr>
-                <a:schemeClr val="dk1"/>
-              </a:buClr>
-              <a:buSzPts val="1100"/>
-              <a:buFont typeface="Arial"/>
-              <a:buNone/>
-            </a:pPr>
-            <a:r>
-              <a:rPr lang="es-CO" sz="1200">
-                <a:solidFill>
-                  <a:schemeClr val="dk1"/>
-                </a:solidFill>
-              </a:rPr>
-              <a:t>processing. Signal &amp; Image Processing: An International Journal (SIPIJ) Vol.6, No.2, April</a:t>
-            </a:r>
-            <a:endParaRPr sz="1200">
-              <a:solidFill>
-                <a:schemeClr val="dk1"/>
-              </a:solidFill>
-            </a:endParaRPr>
-          </a:p>
-          <a:p>
-            <a:pPr indent="0" lvl="0" marL="0" rtl="0" algn="l">
-              <a:lnSpc>
-                <a:spcPct val="115000"/>
-              </a:lnSpc>
-              <a:spcBef>
-                <a:spcPts val="0"/>
-              </a:spcBef>
-              <a:spcAft>
-                <a:spcPts val="0"/>
-              </a:spcAft>
-              <a:buClr>
-                <a:schemeClr val="dk1"/>
-              </a:buClr>
-              <a:buSzPts val="1100"/>
-              <a:buFont typeface="Arial"/>
-              <a:buNone/>
-            </a:pPr>
-            <a:r>
-              <a:rPr lang="es-CO" sz="1200">
-                <a:solidFill>
-                  <a:schemeClr val="dk1"/>
-                </a:solidFill>
-              </a:rPr>
-              <a:t>2015.</a:t>
-            </a:r>
-            <a:endParaRPr sz="1200">
-              <a:solidFill>
-                <a:schemeClr val="dk1"/>
-              </a:solidFill>
-            </a:endParaRPr>
-          </a:p>
-          <a:p>
-            <a:pPr indent="0" lvl="0" marL="0" rtl="0" algn="l">
-              <a:lnSpc>
-                <a:spcPct val="115000"/>
-              </a:lnSpc>
-              <a:spcBef>
-                <a:spcPts val="0"/>
-              </a:spcBef>
-              <a:spcAft>
-                <a:spcPts val="0"/>
-              </a:spcAft>
-              <a:buClr>
-                <a:schemeClr val="dk1"/>
-              </a:buClr>
-              <a:buSzPts val="1100"/>
-              <a:buFont typeface="Arial"/>
-              <a:buNone/>
-            </a:pPr>
-            <a:r>
-              <a:rPr lang="es-CO" sz="1200">
-                <a:solidFill>
-                  <a:schemeClr val="dk1"/>
-                </a:solidFill>
-              </a:rPr>
-              <a:t>[3] Fernández Mc Cann, D. S. (2023). Procesamiento digital de imágenes - Un enfoque práctico. Otras publicaciones Universidad de Antioquia.</a:t>
-            </a:r>
-            <a:endParaRPr sz="1200">
-              <a:solidFill>
-                <a:schemeClr val="dk1"/>
-              </a:solidFill>
-            </a:endParaRPr>
-          </a:p>
-          <a:p>
-            <a:pPr indent="0" lvl="0" marL="0" rtl="0" algn="l">
-              <a:lnSpc>
-                <a:spcPct val="115000"/>
-              </a:lnSpc>
-              <a:spcBef>
-                <a:spcPts val="0"/>
-              </a:spcBef>
-              <a:spcAft>
-                <a:spcPts val="0"/>
-              </a:spcAft>
-              <a:buClr>
-                <a:schemeClr val="dk1"/>
-              </a:buClr>
-              <a:buSzPts val="1100"/>
-              <a:buFont typeface="Arial"/>
-              <a:buNone/>
-            </a:pPr>
-            <a:r>
-              <a:rPr lang="es-CO" sz="1200">
-                <a:solidFill>
-                  <a:schemeClr val="dk1"/>
-                </a:solidFill>
-              </a:rPr>
-              <a:t>[4] E. Woods, R., &amp; C. Gonzalez, R. (2018). Digital image processing (4a ed.). Pearson.</a:t>
-            </a:r>
-            <a:endParaRPr sz="1200">
-              <a:solidFill>
-                <a:schemeClr val="dk1"/>
-              </a:solidFill>
-            </a:endParaRPr>
-          </a:p>
-          <a:p>
-            <a:pPr indent="0" lvl="0" marL="0" rtl="0" algn="l">
-              <a:lnSpc>
-                <a:spcPct val="115000"/>
-              </a:lnSpc>
-              <a:spcBef>
-                <a:spcPts val="0"/>
-              </a:spcBef>
-              <a:spcAft>
-                <a:spcPts val="0"/>
-              </a:spcAft>
-              <a:buClr>
-                <a:schemeClr val="dk1"/>
-              </a:buClr>
-              <a:buSzPts val="1100"/>
-              <a:buFont typeface="Arial"/>
-              <a:buNone/>
-            </a:pPr>
-            <a:r>
-              <a:rPr lang="es-CO" sz="1200">
-                <a:solidFill>
-                  <a:schemeClr val="dk1"/>
-                </a:solidFill>
-              </a:rPr>
-              <a:t>[5] Blokdyk, G. (2020). Artificial vision. A complete guide. Emereo Publishing.</a:t>
+              <a:t/>
             </a:r>
             <a:endParaRPr sz="1200">
               <a:solidFill>
@@ -25956,7 +26007,7 @@
                   <a:schemeClr val="dk1"/>
                 </a:solidFill>
               </a:rPr>
-              <a:t>[2] Sánchez Tarquino, J. E. (2019). Estudio de técnicas de suavización de imágenes basadas en modelos dispersos. Unibague Repositorios. https://repositorio.unibague.edu.co/server/api/core/bitstreams/0816e77f-f2e3-48db-b365-7cc6a0ec9585/content</a:t>
+              <a:t>https://repositorio.unibague.edu.co/server/api/core/bitstreams/0816e77f-f2e3-48db-b365-7cc6a0ec9585/content</a:t>
             </a:r>
             <a:endParaRPr sz="1200">
               <a:solidFill>
@@ -25988,7 +26039,7 @@
                   <a:schemeClr val="dk1"/>
                 </a:solidFill>
               </a:rPr>
-              <a:t>[3] Millán Valbuena, J. L. (2020, junio). Identificación y seguimiento de objetos dinámicos mediante cámara y LiDAR. Universidad Politécnica de Madrid. https://oa.upm.es/63779/1/TFM_JOSE_LUIS_MILLAN_VALBUENA.pdf</a:t>
+              <a:t>[2] Millán Valbuena, J. L. (2020, junio). Identificación y seguimiento de objetos dinámicos mediante cámara y LiDAR. Universidad Politécnica de Madrid. https://oa.upm.es/63779/1/TFM_JOSE_LUIS_MILLAN_VALBUENA.pdf</a:t>
             </a:r>
             <a:endParaRPr sz="1200">
               <a:solidFill>
@@ -25997,29 +26048,35 @@
             </a:endParaRPr>
           </a:p>
           <a:p>
-            <a:pPr indent="0" lvl="0" marL="0" marR="0" rtl="0" algn="l">
-              <a:lnSpc>
-                <a:spcPct val="100000"/>
-              </a:lnSpc>
-              <a:spcBef>
-                <a:spcPts val="0"/>
-              </a:spcBef>
-              <a:spcAft>
-                <a:spcPts val="0"/>
-              </a:spcAft>
+            <a:pPr indent="0" lvl="0" marL="0" rtl="0" algn="l">
+              <a:lnSpc>
+                <a:spcPct val="115000"/>
+              </a:lnSpc>
+              <a:spcBef>
+                <a:spcPts val="0"/>
+              </a:spcBef>
+              <a:spcAft>
+                <a:spcPts val="0"/>
+              </a:spcAft>
+              <a:buClr>
+                <a:schemeClr val="dk1"/>
+              </a:buClr>
+              <a:buSzPts val="1100"/>
+              <a:buFont typeface="Arial"/>
               <a:buNone/>
             </a:pPr>
             <a:r>
-              <a:t/>
+              <a:rPr lang="es-CO" sz="1200">
+                <a:solidFill>
+                  <a:schemeClr val="dk1"/>
+                </a:solidFill>
+              </a:rPr>
+              <a:t>[3] Sánchez Tarquino, J. E. (2019). Estudio de técnicas de suavización de imágenes basadas en modelos dispersos. Unibague Repositorios. </a:t>
             </a:r>
-            <a:endParaRPr sz="600">
+            <a:endParaRPr sz="1200">
               <a:solidFill>
                 <a:schemeClr val="dk1"/>
               </a:solidFill>
-              <a:latin typeface="Calibri"/>
-              <a:ea typeface="Calibri"/>
-              <a:cs typeface="Calibri"/>
-              <a:sym typeface="Calibri"/>
             </a:endParaRPr>
           </a:p>
           <a:p>

</xml_diff>